<commit_message>
Add Index22 to ligand post
</commit_message>
<xml_diff>
--- a/images/ligand/ligand.pptx
+++ b/images/ligand/ligand.pptx
@@ -246,7 +246,7 @@
           <a:p>
             <a:fld id="{E4CC0C5D-4308-CB4B-B4D9-C0C348E4D4F2}" type="datetimeFigureOut">
               <a:rPr lang="en-US" smtClean="0"/>
-              <a:t>4/6/17</a:t>
+              <a:t>4/7/17</a:t>
             </a:fld>
             <a:endParaRPr lang="en-US"/>
           </a:p>
@@ -416,7 +416,7 @@
           <a:p>
             <a:fld id="{E4CC0C5D-4308-CB4B-B4D9-C0C348E4D4F2}" type="datetimeFigureOut">
               <a:rPr lang="en-US" smtClean="0"/>
-              <a:t>4/6/17</a:t>
+              <a:t>4/7/17</a:t>
             </a:fld>
             <a:endParaRPr lang="en-US"/>
           </a:p>
@@ -596,7 +596,7 @@
           <a:p>
             <a:fld id="{E4CC0C5D-4308-CB4B-B4D9-C0C348E4D4F2}" type="datetimeFigureOut">
               <a:rPr lang="en-US" smtClean="0"/>
-              <a:t>4/6/17</a:t>
+              <a:t>4/7/17</a:t>
             </a:fld>
             <a:endParaRPr lang="en-US"/>
           </a:p>
@@ -766,7 +766,7 @@
           <a:p>
             <a:fld id="{E4CC0C5D-4308-CB4B-B4D9-C0C348E4D4F2}" type="datetimeFigureOut">
               <a:rPr lang="en-US" smtClean="0"/>
-              <a:t>4/6/17</a:t>
+              <a:t>4/7/17</a:t>
             </a:fld>
             <a:endParaRPr lang="en-US"/>
           </a:p>
@@ -1012,7 +1012,7 @@
           <a:p>
             <a:fld id="{E4CC0C5D-4308-CB4B-B4D9-C0C348E4D4F2}" type="datetimeFigureOut">
               <a:rPr lang="en-US" smtClean="0"/>
-              <a:t>4/6/17</a:t>
+              <a:t>4/7/17</a:t>
             </a:fld>
             <a:endParaRPr lang="en-US"/>
           </a:p>
@@ -1244,7 +1244,7 @@
           <a:p>
             <a:fld id="{E4CC0C5D-4308-CB4B-B4D9-C0C348E4D4F2}" type="datetimeFigureOut">
               <a:rPr lang="en-US" smtClean="0"/>
-              <a:t>4/6/17</a:t>
+              <a:t>4/7/17</a:t>
             </a:fld>
             <a:endParaRPr lang="en-US"/>
           </a:p>
@@ -1611,7 +1611,7 @@
           <a:p>
             <a:fld id="{E4CC0C5D-4308-CB4B-B4D9-C0C348E4D4F2}" type="datetimeFigureOut">
               <a:rPr lang="en-US" smtClean="0"/>
-              <a:t>4/6/17</a:t>
+              <a:t>4/7/17</a:t>
             </a:fld>
             <a:endParaRPr lang="en-US"/>
           </a:p>
@@ -1729,7 +1729,7 @@
           <a:p>
             <a:fld id="{E4CC0C5D-4308-CB4B-B4D9-C0C348E4D4F2}" type="datetimeFigureOut">
               <a:rPr lang="en-US" smtClean="0"/>
-              <a:t>4/6/17</a:t>
+              <a:t>4/7/17</a:t>
             </a:fld>
             <a:endParaRPr lang="en-US"/>
           </a:p>
@@ -1824,7 +1824,7 @@
           <a:p>
             <a:fld id="{E4CC0C5D-4308-CB4B-B4D9-C0C348E4D4F2}" type="datetimeFigureOut">
               <a:rPr lang="en-US" smtClean="0"/>
-              <a:t>4/6/17</a:t>
+              <a:t>4/7/17</a:t>
             </a:fld>
             <a:endParaRPr lang="en-US"/>
           </a:p>
@@ -2101,7 +2101,7 @@
           <a:p>
             <a:fld id="{E4CC0C5D-4308-CB4B-B4D9-C0C348E4D4F2}" type="datetimeFigureOut">
               <a:rPr lang="en-US" smtClean="0"/>
-              <a:t>4/6/17</a:t>
+              <a:t>4/7/17</a:t>
             </a:fld>
             <a:endParaRPr lang="en-US"/>
           </a:p>
@@ -2354,7 +2354,7 @@
           <a:p>
             <a:fld id="{E4CC0C5D-4308-CB4B-B4D9-C0C348E4D4F2}" type="datetimeFigureOut">
               <a:rPr lang="en-US" smtClean="0"/>
-              <a:t>4/6/17</a:t>
+              <a:t>4/7/17</a:t>
             </a:fld>
             <a:endParaRPr lang="en-US"/>
           </a:p>
@@ -2567,7 +2567,7 @@
           <a:p>
             <a:fld id="{E4CC0C5D-4308-CB4B-B4D9-C0C348E4D4F2}" type="datetimeFigureOut">
               <a:rPr lang="en-US" smtClean="0"/>
-              <a:t>4/6/17</a:t>
+              <a:t>4/7/17</a:t>
             </a:fld>
             <a:endParaRPr lang="en-US"/>
           </a:p>
@@ -3006,7 +3006,7 @@
           <a:bodyPr/>
           <a:lstStyle/>
           <a:p>
-            <a:endParaRPr lang="en-US"/>
+            <a:endParaRPr lang="en-US" dirty="0"/>
           </a:p>
         </p:txBody>
       </p:sp>
@@ -3113,7 +3113,7 @@
           <a:lstStyle/>
           <a:p>
             <a:pPr algn="ctr"/>
-            <a:endParaRPr lang="en-US"/>
+            <a:endParaRPr lang="en-US" dirty="0"/>
           </a:p>
         </p:txBody>
       </p:sp>
@@ -3296,7 +3296,7 @@
           <a:lstStyle/>
           <a:p>
             <a:r>
-              <a:rPr lang="en-US" sz="3200" b="1" smtClean="0">
+              <a:rPr lang="en-US" sz="3200" b="1" dirty="0" smtClean="0">
                 <a:solidFill>
                   <a:schemeClr val="accent1">
                     <a:lumMod val="75000"/>
@@ -3304,6 +3304,48 @@
                 </a:solidFill>
               </a:rPr>
               <a:t>C</a:t>
+            </a:r>
+            <a:endParaRPr lang="en-US" sz="3200" b="1" dirty="0">
+              <a:solidFill>
+                <a:schemeClr val="accent1">
+                  <a:lumMod val="75000"/>
+                </a:schemeClr>
+              </a:solidFill>
+            </a:endParaRPr>
+          </a:p>
+        </p:txBody>
+      </p:sp>
+      <p:sp>
+        <p:nvSpPr>
+          <p:cNvPr id="9" name="TextBox 8"/>
+          <p:cNvSpPr txBox="1"/>
+          <p:nvPr/>
+        </p:nvSpPr>
+        <p:spPr>
+          <a:xfrm>
+            <a:off x="6032483" y="1031814"/>
+            <a:ext cx="2221319" cy="584775"/>
+          </a:xfrm>
+          <a:prstGeom prst="rect">
+            <a:avLst/>
+          </a:prstGeom>
+          <a:noFill/>
+        </p:spPr>
+        <p:txBody>
+          <a:bodyPr wrap="square" rtlCol="0">
+            <a:spAutoFit/>
+          </a:bodyPr>
+          <a:lstStyle/>
+          <a:p>
+            <a:r>
+              <a:rPr lang="en-US" sz="3200" b="1" dirty="0" smtClean="0">
+                <a:solidFill>
+                  <a:schemeClr val="accent1">
+                    <a:lumMod val="75000"/>
+                  </a:schemeClr>
+                </a:solidFill>
+              </a:rPr>
+              <a:t>xy-plane</a:t>
             </a:r>
             <a:endParaRPr lang="en-US" sz="3200" b="1" dirty="0">
               <a:solidFill>
@@ -3448,7 +3490,7 @@
           <a:lstStyle/>
           <a:p>
             <a:pPr algn="ctr"/>
-            <a:endParaRPr lang="en-US"/>
+            <a:endParaRPr lang="en-US" dirty="0"/>
           </a:p>
         </p:txBody>
       </p:sp>
@@ -3631,7 +3673,7 @@
           <a:lstStyle/>
           <a:p>
             <a:r>
-              <a:rPr lang="en-US" sz="3200" b="1" dirty="0">
+              <a:rPr lang="en-US" sz="3200" b="1" dirty="0" err="1">
                 <a:solidFill>
                   <a:schemeClr val="accent1">
                     <a:lumMod val="75000"/>
@@ -3641,6 +3683,16 @@
               <a:t>x</a:t>
             </a:r>
             <a:r>
+              <a:rPr lang="en-US" sz="3200" b="1" dirty="0" err="1" smtClean="0">
+                <a:solidFill>
+                  <a:schemeClr val="accent1">
+                    <a:lumMod val="75000"/>
+                  </a:schemeClr>
+                </a:solidFill>
+              </a:rPr>
+              <a:t>z</a:t>
+            </a:r>
+            <a:r>
               <a:rPr lang="en-US" sz="3200" b="1" dirty="0" smtClean="0">
                 <a:solidFill>
                   <a:schemeClr val="accent1">
@@ -3648,7 +3700,7 @@
                   </a:schemeClr>
                 </a:solidFill>
               </a:rPr>
-              <a:t>z-plane</a:t>
+              <a:t>-plane</a:t>
             </a:r>
             <a:endParaRPr lang="en-US" sz="3200" b="1" dirty="0">
               <a:solidFill>
@@ -3779,7 +3831,7 @@
           <a:lstStyle/>
           <a:p>
             <a:r>
-              <a:rPr lang="en-US" sz="2400" b="1" dirty="0" smtClean="0">
+              <a:rPr lang="en-US" sz="2400" b="1" smtClean="0">
                 <a:solidFill>
                   <a:schemeClr val="accent1">
                     <a:lumMod val="75000"/>
@@ -3788,7 +3840,7 @@
               </a:rPr>
               <a:t>(0, 0, 0)</a:t>
             </a:r>
-            <a:endParaRPr lang="en-US" sz="2400" b="1" dirty="0">
+            <a:endParaRPr lang="en-US" sz="2400" b="1">
               <a:solidFill>
                 <a:schemeClr val="accent1">
                   <a:lumMod val="75000"/>
@@ -3904,7 +3956,7 @@
           <a:lstStyle/>
           <a:p>
             <a:r>
-              <a:rPr lang="en-US" sz="2400" b="1" dirty="0" smtClean="0">
+              <a:rPr lang="en-US" sz="2400" b="1" smtClean="0">
                 <a:solidFill>
                   <a:schemeClr val="accent1">
                     <a:lumMod val="75000"/>
@@ -3913,7 +3965,7 @@
               </a:rPr>
               <a:t>(1.54, 0.45, 1.60)</a:t>
             </a:r>
-            <a:endParaRPr lang="en-US" sz="2400" b="1" dirty="0">
+            <a:endParaRPr lang="en-US" sz="2400" b="1">
               <a:solidFill>
                 <a:schemeClr val="accent1">
                   <a:lumMod val="75000"/>
@@ -3946,7 +3998,7 @@
           <a:lstStyle/>
           <a:p>
             <a:r>
-              <a:rPr lang="en-US" sz="2400" b="1" dirty="0" smtClean="0">
+              <a:rPr lang="en-US" sz="2400" b="1" smtClean="0">
                 <a:solidFill>
                   <a:schemeClr val="accent1">
                     <a:lumMod val="75000"/>
@@ -3955,7 +4007,7 @@
               </a:rPr>
               <a:t>(2.30, 1.72, 1.60)</a:t>
             </a:r>
-            <a:endParaRPr lang="en-US" sz="2400" b="1" dirty="0">
+            <a:endParaRPr lang="en-US" sz="2400" b="1">
               <a:solidFill>
                 <a:schemeClr val="accent1">
                   <a:lumMod val="75000"/>

</xml_diff>